<commit_message>
Update to general presentation for Hendrik
</commit_message>
<xml_diff>
--- a/Meetings/MST1_highlights_topic21.pptx
+++ b/Meetings/MST1_highlights_topic21.pptx
@@ -5,14 +5,15 @@
     <p:sldMasterId id="2147483648" r:id="rId1"/>
   </p:sldMasterIdLst>
   <p:notesMasterIdLst>
-    <p:notesMasterId r:id="rId4"/>
+    <p:notesMasterId r:id="rId5"/>
   </p:notesMasterIdLst>
   <p:handoutMasterIdLst>
-    <p:handoutMasterId r:id="rId5"/>
+    <p:handoutMasterId r:id="rId6"/>
   </p:handoutMasterIdLst>
   <p:sldIdLst>
     <p:sldId id="256" r:id="rId2"/>
     <p:sldId id="257" r:id="rId3"/>
+    <p:sldId id="258" r:id="rId4"/>
   </p:sldIdLst>
   <p:sldSz cx="9144000" cy="6858000" type="screen4x3"/>
   <p:notesSz cx="7099300" cy="10234613"/>
@@ -201,7 +202,7 @@
                 <a:latin typeface="Arial" panose="020B0604020202020204" pitchFamily="34" charset="0"/>
               </a:rPr>
               <a:pPr/>
-              <a:t>04/04/17</a:t>
+              <a:t>04.07.17</a:t>
             </a:fld>
             <a:endParaRPr lang="en-GB" dirty="0">
               <a:latin typeface="Arial" panose="020B0604020202020204" pitchFamily="34" charset="0"/>
@@ -380,7 +381,7 @@
             <a:fld id="{F93E6C17-F35F-4654-8DE9-B693AC206066}" type="datetimeFigureOut">
               <a:rPr lang="en-GB" smtClean="0"/>
               <a:pPr/>
-              <a:t>04/04/17</a:t>
+              <a:t>04.07.17</a:t>
             </a:fld>
             <a:endParaRPr lang="en-GB" dirty="0"/>
           </a:p>
@@ -3281,66 +3282,9 @@
           <a:lstStyle/>
           <a:p>
             <a:r>
-              <a:rPr lang="en-GB" dirty="0"/>
-              <a:t>No significant cross-field transport in L-mode due to RMPs</a:t>
-            </a:r>
-          </a:p>
-        </p:txBody>
-      </p:sp>
-      <p:sp>
-        <p:nvSpPr>
-          <p:cNvPr id="3" name="Content Placeholder 2"/>
-          <p:cNvSpPr>
-            <a:spLocks noGrp="1"/>
-          </p:cNvSpPr>
-          <p:nvPr>
-            <p:ph idx="1"/>
-          </p:nvPr>
-        </p:nvSpPr>
-        <p:spPr>
-          <a:xfrm>
-            <a:off x="457200" y="4883696"/>
-            <a:ext cx="8229600" cy="1425624"/>
-          </a:xfrm>
-        </p:spPr>
-        <p:txBody>
-          <a:bodyPr>
-            <a:normAutofit fontScale="85000" lnSpcReduction="20000"/>
-          </a:bodyPr>
-          <a:lstStyle/>
-          <a:p>
-            <a:r>
-              <a:rPr lang="el-GR" dirty="0"/>
-              <a:t>λ</a:t>
-            </a:r>
-            <a:r>
-              <a:rPr lang="en-GB" baseline="-25000" dirty="0"/>
-              <a:t>q</a:t>
-            </a:r>
-            <a:r>
-              <a:rPr lang="en-GB" dirty="0"/>
-              <a:t> and S are similar for averaged heat flux profiles with RMPs in L-mode compared to reference without RMPs</a:t>
-            </a:r>
-            <a:r>
               <a:rPr lang="en-GB" dirty="0" smtClean="0"/>
-              <a:t>.</a:t>
-            </a:r>
-          </a:p>
-          <a:p>
-            <a:r>
-              <a:rPr lang="en-GB" dirty="0" smtClean="0"/>
-              <a:t>ELM filaments lock to perturbation in H-mode.</a:t>
-            </a:r>
-          </a:p>
-          <a:p>
-            <a:pPr lvl="1"/>
-            <a:r>
-              <a:rPr lang="en-GB" dirty="0" smtClean="0"/>
-              <a:t>Analysis of averaged 2D profile on-going.  </a:t>
-            </a:r>
-            <a:endParaRPr lang="en-GB" dirty="0"/>
-          </a:p>
-          <a:p>
+              <a:t>Filamentary transport in high density (high-power) regimes</a:t>
+            </a:r>
             <a:endParaRPr lang="en-GB" dirty="0"/>
           </a:p>
         </p:txBody>
@@ -3379,14 +3323,14 @@
       </p:sp>
       <p:sp>
         <p:nvSpPr>
-          <p:cNvPr id="5" name="TextBox 4"/>
+          <p:cNvPr id="7" name="TextBox 6"/>
           <p:cNvSpPr txBox="1"/>
           <p:nvPr/>
         </p:nvSpPr>
         <p:spPr>
           <a:xfrm>
-            <a:off x="2" y="6351711"/>
-            <a:ext cx="3851920" cy="461665"/>
+            <a:off x="3491880" y="830903"/>
+            <a:ext cx="5184576" cy="1477328"/>
           </a:xfrm>
           <a:prstGeom prst="rect">
             <a:avLst/>
@@ -3399,38 +3343,66 @@
           </a:bodyPr>
           <a:lstStyle/>
           <a:p>
-            <a:r>
-              <a:rPr lang="en-GB" sz="1200" i="1" smtClean="0">
-                <a:solidFill>
-                  <a:schemeClr val="accent1">
-                    <a:lumMod val="75000"/>
-                  </a:schemeClr>
-                </a:solidFill>
+            <a:pPr marL="285750" indent="-285750">
+              <a:buFont typeface="Arial"/>
+              <a:buChar char="•"/>
+            </a:pPr>
+            <a:r>
+              <a:rPr lang="en-GB" dirty="0" smtClean="0">
                 <a:latin typeface="Arial"/>
                 <a:cs typeface="Arial"/>
               </a:rPr>
-              <a:t>M. Faitsch et al. accepted Nucl. Mat. and Energy</a:t>
-            </a:r>
-          </a:p>
-          <a:p>
-            <a:r>
-              <a:rPr lang="en-GB" sz="1200" i="1" smtClean="0">
-                <a:solidFill>
-                  <a:schemeClr val="accent1">
-                    <a:lumMod val="75000"/>
-                  </a:schemeClr>
-                </a:solidFill>
+              <a:t>Filamentary transport studies extended to low power H-Mode in 2016 in AUG</a:t>
+            </a:r>
+          </a:p>
+          <a:p>
+            <a:pPr marL="285750" indent="-285750">
+              <a:buFont typeface="Arial"/>
+              <a:buChar char="•"/>
+            </a:pPr>
+            <a:r>
+              <a:rPr lang="en-GB" dirty="0" smtClean="0">
                 <a:latin typeface="Arial"/>
                 <a:cs typeface="Arial"/>
               </a:rPr>
-              <a:t>M. Faitsch, ASDEX Upgrade Programme Seminar</a:t>
-            </a:r>
-            <a:endParaRPr lang="en-GB" sz="1200" i="1">
-              <a:solidFill>
-                <a:schemeClr val="accent1">
-                  <a:lumMod val="75000"/>
-                </a:schemeClr>
-              </a:solidFill>
+              <a:t>Dependence on </a:t>
+            </a:r>
+            <a:r>
+              <a:rPr lang="en-GB" dirty="0" err="1" smtClean="0">
+                <a:latin typeface="Arial"/>
+                <a:cs typeface="Arial"/>
+              </a:rPr>
+              <a:t>divertor</a:t>
+            </a:r>
+            <a:r>
+              <a:rPr lang="en-GB" dirty="0" smtClean="0">
+                <a:latin typeface="Arial"/>
+                <a:cs typeface="Arial"/>
+              </a:rPr>
+              <a:t> </a:t>
+            </a:r>
+            <a:r>
+              <a:rPr lang="en-GB" dirty="0" err="1" smtClean="0">
+                <a:latin typeface="Arial"/>
+                <a:cs typeface="Arial"/>
+              </a:rPr>
+              <a:t>collisionality</a:t>
+            </a:r>
+            <a:r>
+              <a:rPr lang="en-GB" dirty="0" smtClean="0">
+                <a:latin typeface="Arial"/>
+                <a:cs typeface="Arial"/>
+              </a:rPr>
+              <a:t> less robust in H-Mode with strong dependence on total </a:t>
+            </a:r>
+            <a:r>
+              <a:rPr lang="en-GB" dirty="0" err="1" smtClean="0">
+                <a:latin typeface="Arial"/>
+                <a:cs typeface="Arial"/>
+              </a:rPr>
+              <a:t>fueling</a:t>
+            </a:r>
+            <a:endParaRPr lang="en-GB" dirty="0" smtClean="0">
               <a:latin typeface="Arial"/>
               <a:cs typeface="Arial"/>
             </a:endParaRPr>
@@ -3439,75 +3411,353 @@
       </p:sp>
       <p:pic>
         <p:nvPicPr>
-          <p:cNvPr id="6" name="Picture 5"/>
+          <p:cNvPr id="11" name="Picture 10" descr="Screen Shot 2017-07-04 at 15.28.19.png"/>
           <p:cNvPicPr>
             <a:picLocks noChangeAspect="1"/>
           </p:cNvPicPr>
           <p:nvPr/>
         </p:nvPicPr>
-        <p:blipFill>
-          <a:blip r:embed="rId2"/>
-          <a:stretch>
-            <a:fillRect/>
-          </a:stretch>
+        <p:blipFill rotWithShape="1">
+          <a:blip r:embed="rId2">
+            <a:extLst>
+              <a:ext uri="{28A0092B-C50C-407E-A947-70E740481C1C}">
+                <a14:useLocalDpi xmlns:a14="http://schemas.microsoft.com/office/drawing/2010/main" val="0"/>
+              </a:ext>
+            </a:extLst>
+          </a:blip>
+          <a:srcRect t="-3274" b="34346"/>
+          <a:stretch/>
         </p:blipFill>
         <p:spPr>
           <a:xfrm>
-            <a:off x="1331640" y="692696"/>
-            <a:ext cx="5461000" cy="4191000"/>
+            <a:off x="45384" y="3109124"/>
+            <a:ext cx="3839191" cy="2780928"/>
           </a:xfrm>
           <a:prstGeom prst="rect">
             <a:avLst/>
           </a:prstGeom>
         </p:spPr>
       </p:pic>
-      <p:sp>
-        <p:nvSpPr>
-          <p:cNvPr id="7" name="TextBox 6"/>
-          <p:cNvSpPr txBox="1"/>
+      <p:grpSp>
+        <p:nvGrpSpPr>
+          <p:cNvPr id="15" name="Group 14"/>
+          <p:cNvGrpSpPr/>
           <p:nvPr/>
-        </p:nvSpPr>
-        <p:spPr>
-          <a:xfrm>
-            <a:off x="7199644" y="1043444"/>
-            <a:ext cx="1487156" cy="369332"/>
+        </p:nvGrpSpPr>
+        <p:grpSpPr>
+          <a:xfrm>
+            <a:off x="74961" y="859186"/>
+            <a:ext cx="2768847" cy="2065758"/>
+            <a:chOff x="166507" y="830902"/>
+            <a:chExt cx="4706530" cy="3702988"/>
+          </a:xfrm>
+        </p:grpSpPr>
+        <p:pic>
+          <p:nvPicPr>
+            <p:cNvPr id="12" name="Picture 11" descr="Screen Shot 2017-07-04 at 15.28.40.png"/>
+            <p:cNvPicPr>
+              <a:picLocks noChangeAspect="1"/>
+            </p:cNvPicPr>
+            <p:nvPr/>
+          </p:nvPicPr>
+          <p:blipFill rotWithShape="1">
+            <a:blip r:embed="rId3">
+              <a:extLst>
+                <a:ext uri="{28A0092B-C50C-407E-A947-70E740481C1C}">
+                  <a14:useLocalDpi xmlns:a14="http://schemas.microsoft.com/office/drawing/2010/main" val="0"/>
+                </a:ext>
+              </a:extLst>
+            </a:blip>
+            <a:srcRect l="53680" t="46090"/>
+            <a:stretch/>
+          </p:blipFill>
+          <p:spPr>
+            <a:xfrm>
+              <a:off x="668083" y="830902"/>
+              <a:ext cx="4204954" cy="3697111"/>
+            </a:xfrm>
+            <a:prstGeom prst="rect">
+              <a:avLst/>
+            </a:prstGeom>
+          </p:spPr>
+        </p:pic>
+        <p:pic>
+          <p:nvPicPr>
+            <p:cNvPr id="13" name="Picture 12" descr="Screen Shot 2017-07-04 at 15.28.40.png"/>
+            <p:cNvPicPr>
+              <a:picLocks noChangeAspect="1"/>
+            </p:cNvPicPr>
+            <p:nvPr/>
+          </p:nvPicPr>
+          <p:blipFill rotWithShape="1">
+            <a:blip r:embed="rId3">
+              <a:extLst>
+                <a:ext uri="{28A0092B-C50C-407E-A947-70E740481C1C}">
+                  <a14:useLocalDpi xmlns:a14="http://schemas.microsoft.com/office/drawing/2010/main" val="0"/>
+                </a:ext>
+              </a:extLst>
+            </a:blip>
+            <a:srcRect t="46090" r="93368"/>
+            <a:stretch/>
+          </p:blipFill>
+          <p:spPr>
+            <a:xfrm>
+              <a:off x="166507" y="836779"/>
+              <a:ext cx="602074" cy="3697111"/>
+            </a:xfrm>
+            <a:prstGeom prst="rect">
+              <a:avLst/>
+            </a:prstGeom>
+          </p:spPr>
+        </p:pic>
+      </p:grpSp>
+      <p:sp>
+        <p:nvSpPr>
+          <p:cNvPr id="14" name="Rectangle 13"/>
+          <p:cNvSpPr/>
+          <p:nvPr/>
+        </p:nvSpPr>
+        <p:spPr>
+          <a:xfrm>
+            <a:off x="74961" y="6467482"/>
+            <a:ext cx="3809614" cy="345900"/>
+          </a:xfrm>
+          <a:prstGeom prst="rect">
+            <a:avLst/>
+          </a:prstGeom>
+        </p:spPr>
+        <p:txBody>
+          <a:bodyPr wrap="square">
+            <a:spAutoFit/>
+          </a:bodyPr>
+          <a:lstStyle/>
+          <a:p>
+            <a:r>
+              <a:rPr lang="en-US" sz="1600" i="1" dirty="0" err="1" smtClean="0">
+                <a:solidFill>
+                  <a:schemeClr val="bg1">
+                    <a:lumMod val="50000"/>
+                  </a:schemeClr>
+                </a:solidFill>
+              </a:rPr>
+              <a:t>Carralero</a:t>
+            </a:r>
+            <a:r>
+              <a:rPr lang="en-US" sz="1600" i="1" dirty="0" smtClean="0">
+                <a:solidFill>
+                  <a:schemeClr val="bg1">
+                    <a:lumMod val="50000"/>
+                  </a:schemeClr>
+                </a:solidFill>
+              </a:rPr>
+              <a:t> </a:t>
+            </a:r>
+            <a:r>
+              <a:rPr lang="en-US" sz="1600" i="1" dirty="0">
+                <a:solidFill>
+                  <a:schemeClr val="bg1">
+                    <a:lumMod val="50000"/>
+                  </a:schemeClr>
+                </a:solidFill>
+              </a:rPr>
+              <a:t>D</a:t>
+            </a:r>
+            <a:r>
+              <a:rPr lang="en-US" sz="1600" i="1" dirty="0" smtClean="0">
+                <a:solidFill>
+                  <a:schemeClr val="bg1">
+                    <a:lumMod val="50000"/>
+                  </a:schemeClr>
+                </a:solidFill>
+              </a:rPr>
+              <a:t>, et al Nuclear </a:t>
+            </a:r>
+            <a:r>
+              <a:rPr lang="en-US" sz="1600" i="1" dirty="0">
+                <a:solidFill>
+                  <a:schemeClr val="bg1">
+                    <a:lumMod val="50000"/>
+                  </a:schemeClr>
+                </a:solidFill>
+              </a:rPr>
+              <a:t>Fusion 57 056044</a:t>
+            </a:r>
+          </a:p>
+        </p:txBody>
+      </p:sp>
+      <p:pic>
+        <p:nvPicPr>
+          <p:cNvPr id="16" name="Picture 15" descr="Fig13.png"/>
+          <p:cNvPicPr>
+            <a:picLocks noChangeAspect="1"/>
+          </p:cNvPicPr>
+          <p:nvPr/>
+        </p:nvPicPr>
+        <p:blipFill rotWithShape="1">
+          <a:blip r:embed="rId4">
+            <a:extLst>
+              <a:ext uri="{28A0092B-C50C-407E-A947-70E740481C1C}">
+                <a14:useLocalDpi xmlns:a14="http://schemas.microsoft.com/office/drawing/2010/main" val="0"/>
+              </a:ext>
+            </a:extLst>
+          </a:blip>
+          <a:srcRect l="49382"/>
+          <a:stretch/>
+        </p:blipFill>
+        <p:spPr>
+          <a:xfrm>
+            <a:off x="5004610" y="3139227"/>
+            <a:ext cx="3095784" cy="2780028"/>
+          </a:xfrm>
+          <a:prstGeom prst="rect">
+            <a:avLst/>
+          </a:prstGeom>
+        </p:spPr>
+      </p:pic>
+      <p:sp>
+        <p:nvSpPr>
+          <p:cNvPr id="17" name="Rectangle 16"/>
+          <p:cNvSpPr/>
+          <p:nvPr/>
+        </p:nvSpPr>
+        <p:spPr>
+          <a:xfrm>
+            <a:off x="45384" y="5890052"/>
+            <a:ext cx="4572000" cy="584776"/>
+          </a:xfrm>
+          <a:prstGeom prst="rect">
+            <a:avLst/>
+          </a:prstGeom>
+        </p:spPr>
+        <p:txBody>
+          <a:bodyPr>
+            <a:spAutoFit/>
+          </a:bodyPr>
+          <a:lstStyle/>
+          <a:p>
+            <a:pPr marL="285750" indent="-285750">
+              <a:buFont typeface="Arial"/>
+              <a:buChar char="•"/>
+            </a:pPr>
+            <a:r>
+              <a:rPr lang="en-GB" sz="1600" dirty="0">
+                <a:latin typeface="Arial"/>
+                <a:cs typeface="Arial"/>
+              </a:rPr>
+              <a:t>Role of neutrals at the </a:t>
+            </a:r>
+            <a:r>
+              <a:rPr lang="en-GB" sz="1600" dirty="0" err="1">
+                <a:latin typeface="Arial"/>
+                <a:cs typeface="Arial"/>
+              </a:rPr>
+              <a:t>midplane</a:t>
+            </a:r>
+            <a:r>
+              <a:rPr lang="en-GB" sz="1600" dirty="0">
+                <a:latin typeface="Arial"/>
+                <a:cs typeface="Arial"/>
+              </a:rPr>
+              <a:t> investigated so far by EIRENCE numerical simulations</a:t>
+            </a:r>
+          </a:p>
+        </p:txBody>
+      </p:sp>
+      <p:sp>
+        <p:nvSpPr>
+          <p:cNvPr id="18" name="Rectangle 17"/>
+          <p:cNvSpPr/>
+          <p:nvPr/>
+        </p:nvSpPr>
+        <p:spPr>
+          <a:xfrm>
+            <a:off x="47220" y="764704"/>
+            <a:ext cx="8917268" cy="2156961"/>
           </a:xfrm>
           <a:prstGeom prst="rect">
             <a:avLst/>
           </a:prstGeom>
           <a:noFill/>
-        </p:spPr>
-        <p:txBody>
-          <a:bodyPr wrap="none" rtlCol="0">
-            <a:spAutoFit/>
-          </a:bodyPr>
+          <a:effectLst/>
+        </p:spPr>
+        <p:style>
+          <a:lnRef idx="1">
+            <a:schemeClr val="accent1"/>
+          </a:lnRef>
+          <a:fillRef idx="3">
+            <a:schemeClr val="accent1"/>
+          </a:fillRef>
+          <a:effectRef idx="2">
+            <a:schemeClr val="accent1"/>
+          </a:effectRef>
+          <a:fontRef idx="minor">
+            <a:schemeClr val="lt1"/>
+          </a:fontRef>
+        </p:style>
+        <p:txBody>
+          <a:bodyPr rtlCol="0" anchor="ctr"/>
           <a:lstStyle/>
           <a:p>
-            <a:r>
-              <a:rPr lang="en-GB" dirty="0" smtClean="0">
-                <a:latin typeface="Arial"/>
-                <a:cs typeface="Arial"/>
-              </a:rPr>
-              <a:t>L-mode, n=2</a:t>
-            </a:r>
-          </a:p>
-        </p:txBody>
-      </p:sp>
-      <p:sp>
-        <p:nvSpPr>
-          <p:cNvPr id="9" name="TextBox 8"/>
-          <p:cNvSpPr txBox="1"/>
+            <a:pPr algn="ctr"/>
+            <a:endParaRPr lang="en-US" dirty="0"/>
+          </a:p>
+        </p:txBody>
+      </p:sp>
+      <p:sp>
+        <p:nvSpPr>
+          <p:cNvPr id="19" name="Rectangle 18"/>
+          <p:cNvSpPr/>
           <p:nvPr/>
         </p:nvSpPr>
         <p:spPr>
           <a:xfrm>
-            <a:off x="6765566" y="2492896"/>
-            <a:ext cx="2270930" cy="1200329"/>
+            <a:off x="45384" y="3140968"/>
+            <a:ext cx="4427984" cy="3333860"/>
           </a:xfrm>
           <a:prstGeom prst="rect">
             <a:avLst/>
           </a:prstGeom>
           <a:noFill/>
+          <a:effectLst/>
+        </p:spPr>
+        <p:style>
+          <a:lnRef idx="1">
+            <a:schemeClr val="accent1"/>
+          </a:lnRef>
+          <a:fillRef idx="3">
+            <a:schemeClr val="accent1"/>
+          </a:fillRef>
+          <a:effectRef idx="2">
+            <a:schemeClr val="accent1"/>
+          </a:effectRef>
+          <a:fontRef idx="minor">
+            <a:schemeClr val="lt1"/>
+          </a:fontRef>
+        </p:style>
+        <p:txBody>
+          <a:bodyPr rtlCol="0" anchor="ctr"/>
+          <a:lstStyle/>
+          <a:p>
+            <a:pPr algn="ctr"/>
+            <a:endParaRPr lang="en-US" dirty="0"/>
+          </a:p>
+        </p:txBody>
+      </p:sp>
+      <p:sp>
+        <p:nvSpPr>
+          <p:cNvPr id="20" name="TextBox 19"/>
+          <p:cNvSpPr txBox="1"/>
+          <p:nvPr/>
+        </p:nvSpPr>
+        <p:spPr>
+          <a:xfrm>
+            <a:off x="4475517" y="5821151"/>
+            <a:ext cx="5427224" cy="646331"/>
+          </a:xfrm>
+          <a:prstGeom prst="rect">
+            <a:avLst/>
+          </a:prstGeom>
+          <a:noFill/>
         </p:spPr>
         <p:txBody>
           <a:bodyPr wrap="square" rtlCol="0">
@@ -3516,82 +3766,111 @@
           <a:lstStyle/>
           <a:p>
             <a:r>
-              <a:rPr lang="en-GB" dirty="0" smtClean="0">
+              <a:rPr lang="en-US" dirty="0" smtClean="0">
                 <a:latin typeface="Arial"/>
                 <a:cs typeface="Arial"/>
               </a:rPr>
-              <a:t>Obtain data for ELM suppression and mixed mode spectrum in 2017.</a:t>
-            </a:r>
-          </a:p>
-        </p:txBody>
-      </p:sp>
-      <p:sp>
-        <p:nvSpPr>
-          <p:cNvPr id="8" name="TextBox 7"/>
-          <p:cNvSpPr txBox="1"/>
+              <a:t>TCV L-Mode confirms complex dependence </a:t>
+            </a:r>
+          </a:p>
+          <a:p>
+            <a:r>
+              <a:rPr lang="en-US" dirty="0" smtClean="0">
+                <a:latin typeface="Arial"/>
+                <a:cs typeface="Arial"/>
+              </a:rPr>
+              <a:t>on </a:t>
+            </a:r>
+            <a:r>
+              <a:rPr lang="en-US" dirty="0" err="1" smtClean="0">
+                <a:latin typeface="Arial"/>
+                <a:cs typeface="Arial"/>
+              </a:rPr>
+              <a:t>Divertor</a:t>
+            </a:r>
+            <a:r>
+              <a:rPr lang="en-US" dirty="0" smtClean="0">
+                <a:latin typeface="Arial"/>
+                <a:cs typeface="Arial"/>
+              </a:rPr>
+              <a:t> </a:t>
+            </a:r>
+            <a:r>
+              <a:rPr lang="en-US" dirty="0" err="1" smtClean="0">
+                <a:latin typeface="Arial"/>
+                <a:cs typeface="Arial"/>
+              </a:rPr>
+              <a:t>collisionality</a:t>
+            </a:r>
+            <a:r>
+              <a:rPr lang="en-US" dirty="0" smtClean="0">
+                <a:latin typeface="Arial"/>
+                <a:cs typeface="Arial"/>
+              </a:rPr>
+              <a:t> </a:t>
+            </a:r>
+            <a:r>
+              <a:rPr lang="en-US" sz="1600" i="1" dirty="0" smtClean="0">
+                <a:solidFill>
+                  <a:srgbClr val="7F7F7F"/>
+                </a:solidFill>
+                <a:latin typeface="Arial"/>
+                <a:cs typeface="Arial"/>
+              </a:rPr>
+              <a:t>(Vianello IAEA 2016) </a:t>
+            </a:r>
+            <a:endParaRPr lang="en-US" sz="1600" i="1" dirty="0" smtClean="0">
+              <a:solidFill>
+                <a:srgbClr val="7F7F7F"/>
+              </a:solidFill>
+              <a:latin typeface="Arial"/>
+              <a:cs typeface="Arial"/>
+            </a:endParaRPr>
+          </a:p>
+        </p:txBody>
+      </p:sp>
+      <p:sp>
+        <p:nvSpPr>
+          <p:cNvPr id="21" name="Rectangle 20"/>
+          <p:cNvSpPr/>
           <p:nvPr/>
         </p:nvSpPr>
         <p:spPr>
           <a:xfrm>
-            <a:off x="6593091" y="6252008"/>
-            <a:ext cx="2448272" cy="276999"/>
+            <a:off x="4528797" y="3139227"/>
+            <a:ext cx="4579707" cy="3321947"/>
           </a:xfrm>
           <a:prstGeom prst="rect">
             <a:avLst/>
           </a:prstGeom>
           <a:noFill/>
-        </p:spPr>
-        <p:txBody>
-          <a:bodyPr wrap="square" rtlCol="0">
-            <a:spAutoFit/>
-          </a:bodyPr>
+          <a:ln>
+            <a:solidFill>
+              <a:srgbClr val="FF6600"/>
+            </a:solidFill>
+          </a:ln>
+          <a:effectLst/>
+        </p:spPr>
+        <p:style>
+          <a:lnRef idx="1">
+            <a:schemeClr val="accent1"/>
+          </a:lnRef>
+          <a:fillRef idx="3">
+            <a:schemeClr val="accent1"/>
+          </a:fillRef>
+          <a:effectRef idx="2">
+            <a:schemeClr val="accent1"/>
+          </a:effectRef>
+          <a:fontRef idx="minor">
+            <a:schemeClr val="lt1"/>
+          </a:fontRef>
+        </p:style>
+        <p:txBody>
+          <a:bodyPr rtlCol="0" anchor="ctr"/>
           <a:lstStyle/>
           <a:p>
-            <a:r>
-              <a:rPr lang="en-GB" sz="1200" i="1" dirty="0" smtClean="0">
-                <a:solidFill>
-                  <a:schemeClr val="bg1">
-                    <a:lumMod val="50000"/>
-                  </a:schemeClr>
-                </a:solidFill>
-                <a:latin typeface="Arial"/>
-                <a:cs typeface="Arial"/>
-              </a:rPr>
-              <a:t>AUG16-1.2-6 (M. </a:t>
-            </a:r>
-            <a:r>
-              <a:rPr lang="en-GB" sz="1200" i="1" dirty="0" err="1" smtClean="0">
-                <a:solidFill>
-                  <a:schemeClr val="bg1">
-                    <a:lumMod val="50000"/>
-                  </a:schemeClr>
-                </a:solidFill>
-                <a:latin typeface="Arial"/>
-                <a:cs typeface="Arial"/>
-              </a:rPr>
-              <a:t>Faitsch</a:t>
-            </a:r>
-            <a:r>
-              <a:rPr lang="en-GB" sz="1200" i="1" dirty="0" smtClean="0">
-                <a:solidFill>
-                  <a:schemeClr val="bg1">
-                    <a:lumMod val="50000"/>
-                  </a:schemeClr>
-                </a:solidFill>
-                <a:latin typeface="Arial"/>
-                <a:cs typeface="Arial"/>
-              </a:rPr>
-              <a:t>, Y. Liu)</a:t>
-            </a:r>
-            <a:endParaRPr lang="en-GB" sz="1200" i="1" dirty="0" smtClean="0">
-              <a:solidFill>
-                <a:schemeClr val="bg1">
-                  <a:lumMod val="50000"/>
-                </a:schemeClr>
-              </a:solidFill>
-              <a:latin typeface="Arial"/>
-              <a:cs typeface="Arial"/>
-            </a:endParaRPr>
+            <a:pPr algn="ctr"/>
+            <a:endParaRPr lang="en-US" dirty="0"/>
           </a:p>
         </p:txBody>
       </p:sp>
@@ -3612,6 +3891,79 @@
       </p:par>
     </p:tnLst>
   </p:timing>
+</p:sld>
+</file>
+
+<file path=ppt/slides/slide3.xml><?xml version="1.0" encoding="utf-8"?>
+<p:sld xmlns:a="http://schemas.openxmlformats.org/drawingml/2006/main" xmlns:r="http://schemas.openxmlformats.org/officeDocument/2006/relationships" xmlns:p="http://schemas.openxmlformats.org/presentationml/2006/main">
+  <p:cSld>
+    <p:spTree>
+      <p:nvGrpSpPr>
+        <p:cNvPr id="1" name=""/>
+        <p:cNvGrpSpPr/>
+        <p:nvPr/>
+      </p:nvGrpSpPr>
+      <p:grpSpPr>
+        <a:xfrm>
+          <a:off x="0" y="0"/>
+          <a:ext cx="0" cy="0"/>
+          <a:chOff x="0" y="0"/>
+          <a:chExt cx="0" cy="0"/>
+        </a:xfrm>
+      </p:grpSpPr>
+      <p:sp>
+        <p:nvSpPr>
+          <p:cNvPr id="2" name="Title 1"/>
+          <p:cNvSpPr>
+            <a:spLocks noGrp="1"/>
+          </p:cNvSpPr>
+          <p:nvPr>
+            <p:ph type="title"/>
+          </p:nvPr>
+        </p:nvSpPr>
+        <p:spPr/>
+        <p:txBody>
+          <a:bodyPr/>
+          <a:lstStyle/>
+          <a:p>
+            <a:endParaRPr lang="en-US"/>
+          </a:p>
+        </p:txBody>
+      </p:sp>
+      <p:sp>
+        <p:nvSpPr>
+          <p:cNvPr id="4" name="Footer Placeholder 3"/>
+          <p:cNvSpPr>
+            <a:spLocks noGrp="1"/>
+          </p:cNvSpPr>
+          <p:nvPr>
+            <p:ph type="ftr" sz="quarter" idx="11"/>
+          </p:nvPr>
+        </p:nvSpPr>
+        <p:spPr/>
+        <p:txBody>
+          <a:bodyPr/>
+          <a:lstStyle/>
+          <a:p>
+            <a:pPr algn="r"/>
+            <a:r>
+              <a:rPr lang="en-GB" smtClean="0"/>
+              <a:t>H. Meyer | ITPA PEP TGM | Garching, Germany | 23rd Oct. 2015 |</a:t>
+            </a:r>
+            <a:endParaRPr lang="en-GB" dirty="0"/>
+          </a:p>
+        </p:txBody>
+      </p:sp>
+    </p:spTree>
+    <p:extLst>
+      <p:ext uri="{BB962C8B-B14F-4D97-AF65-F5344CB8AC3E}">
+        <p14:creationId xmlns:p14="http://schemas.microsoft.com/office/powerpoint/2010/main" val="50675780"/>
+      </p:ext>
+    </p:extLst>
+  </p:cSld>
+  <p:clrMapOvr>
+    <a:masterClrMapping/>
+  </p:clrMapOvr>
 </p:sld>
 </file>
 

</xml_diff>

<commit_message>
Update to PPTX slide for Hendrik
</commit_message>
<xml_diff>
--- a/Meetings/MST1_highlights_topic21.pptx
+++ b/Meetings/MST1_highlights_topic21.pptx
@@ -11,9 +11,9 @@
     <p:handoutMasterId r:id="rId6"/>
   </p:handoutMasterIdLst>
   <p:sldIdLst>
-    <p:sldId id="256" r:id="rId2"/>
-    <p:sldId id="257" r:id="rId3"/>
-    <p:sldId id="258" r:id="rId4"/>
+    <p:sldId id="257" r:id="rId2"/>
+    <p:sldId id="258" r:id="rId3"/>
+    <p:sldId id="259" r:id="rId4"/>
   </p:sldIdLst>
   <p:sldSz cx="9144000" cy="6858000" type="screen4x3"/>
   <p:notesSz cx="7099300" cy="10234613"/>
@@ -3169,110 +3169,6 @@
             <a:spLocks noGrp="1"/>
           </p:cNvSpPr>
           <p:nvPr>
-            <p:ph type="ctrTitle"/>
-          </p:nvPr>
-        </p:nvSpPr>
-        <p:spPr/>
-        <p:txBody>
-          <a:bodyPr>
-            <a:normAutofit/>
-          </a:bodyPr>
-          <a:lstStyle/>
-          <a:p>
-            <a:r>
-              <a:rPr lang="en-US" dirty="0" smtClean="0"/>
-              <a:t>Highlights of the EUROfusion MST1 campaigns 2015-2016</a:t>
-            </a:r>
-            <a:endParaRPr lang="en-US" dirty="0"/>
-          </a:p>
-        </p:txBody>
-      </p:sp>
-      <p:sp>
-        <p:nvSpPr>
-          <p:cNvPr id="3" name="Subtitle 2"/>
-          <p:cNvSpPr>
-            <a:spLocks noGrp="1"/>
-          </p:cNvSpPr>
-          <p:nvPr>
-            <p:ph type="subTitle" idx="1"/>
-          </p:nvPr>
-        </p:nvSpPr>
-        <p:spPr>
-          <a:xfrm>
-            <a:off x="395536" y="4077072"/>
-            <a:ext cx="8640960" cy="1296144"/>
-          </a:xfrm>
-        </p:spPr>
-        <p:txBody>
-          <a:bodyPr>
-            <a:normAutofit/>
-          </a:bodyPr>
-          <a:lstStyle/>
-          <a:p>
-            <a:r>
-              <a:rPr lang="en-GB" b="0" i="1" dirty="0" smtClean="0"/>
-              <a:t>The MST1 Task Force Leaders</a:t>
-            </a:r>
-            <a:endParaRPr lang="en-GB" b="0" i="1" dirty="0"/>
-          </a:p>
-        </p:txBody>
-      </p:sp>
-      <p:sp>
-        <p:nvSpPr>
-          <p:cNvPr id="4" name="Picture Placeholder 3"/>
-          <p:cNvSpPr>
-            <a:spLocks noGrp="1"/>
-          </p:cNvSpPr>
-          <p:nvPr>
-            <p:ph type="pic" sz="quarter" idx="10"/>
-          </p:nvPr>
-        </p:nvSpPr>
-        <p:spPr/>
-      </p:sp>
-    </p:spTree>
-    <p:extLst>
-      <p:ext uri="{BB962C8B-B14F-4D97-AF65-F5344CB8AC3E}">
-        <p14:creationId xmlns:p14="http://schemas.microsoft.com/office/powerpoint/2010/main" val="697402911"/>
-      </p:ext>
-    </p:extLst>
-  </p:cSld>
-  <p:clrMapOvr>
-    <a:masterClrMapping/>
-  </p:clrMapOvr>
-  <p:timing>
-    <p:tnLst>
-      <p:par>
-        <p:cTn xmlns:p14="http://schemas.microsoft.com/office/powerpoint/2010/main" id="1" dur="indefinite" restart="never" nodeType="tmRoot"/>
-      </p:par>
-    </p:tnLst>
-  </p:timing>
-</p:sld>
-</file>
-
-<file path=ppt/slides/slide2.xml><?xml version="1.0" encoding="utf-8"?>
-<p:sld xmlns:a="http://schemas.openxmlformats.org/drawingml/2006/main" xmlns:r="http://schemas.openxmlformats.org/officeDocument/2006/relationships" xmlns:p="http://schemas.openxmlformats.org/presentationml/2006/main">
-  <p:cSld>
-    <p:spTree>
-      <p:nvGrpSpPr>
-        <p:cNvPr id="1" name=""/>
-        <p:cNvGrpSpPr/>
-        <p:nvPr/>
-      </p:nvGrpSpPr>
-      <p:grpSpPr>
-        <a:xfrm>
-          <a:off x="0" y="0"/>
-          <a:ext cx="0" cy="0"/>
-          <a:chOff x="0" y="0"/>
-          <a:chExt cx="0" cy="0"/>
-        </a:xfrm>
-      </p:grpSpPr>
-      <p:sp>
-        <p:nvSpPr>
-          <p:cNvPr id="2" name="Title 1"/>
-          <p:cNvSpPr>
-            <a:spLocks noGrp="1"/>
-          </p:cNvSpPr>
-          <p:nvPr>
             <p:ph type="title"/>
           </p:nvPr>
         </p:nvSpPr>
@@ -3874,10 +3770,424 @@
           </a:p>
         </p:txBody>
       </p:sp>
+      <p:sp>
+        <p:nvSpPr>
+          <p:cNvPr id="22" name="Rectangle 21"/>
+          <p:cNvSpPr/>
+          <p:nvPr/>
+        </p:nvSpPr>
+        <p:spPr>
+          <a:xfrm>
+            <a:off x="2843808" y="2367171"/>
+            <a:ext cx="5958408" cy="369332"/>
+          </a:xfrm>
+          <a:prstGeom prst="rect">
+            <a:avLst/>
+          </a:prstGeom>
+        </p:spPr>
+        <p:txBody>
+          <a:bodyPr wrap="square">
+            <a:spAutoFit/>
+          </a:bodyPr>
+          <a:lstStyle/>
+          <a:p>
+            <a:r>
+              <a:rPr lang="en-US" i="1" dirty="0" err="1" smtClean="0">
+                <a:solidFill>
+                  <a:srgbClr val="7F7F7F"/>
+                </a:solidFill>
+              </a:rPr>
+              <a:t>Carralero</a:t>
+            </a:r>
+            <a:r>
+              <a:rPr lang="en-US" i="1" dirty="0" smtClean="0">
+                <a:solidFill>
+                  <a:srgbClr val="7F7F7F"/>
+                </a:solidFill>
+              </a:rPr>
+              <a:t> </a:t>
+            </a:r>
+            <a:r>
+              <a:rPr lang="en-US" i="1" dirty="0">
+                <a:solidFill>
+                  <a:srgbClr val="7F7F7F"/>
+                </a:solidFill>
+              </a:rPr>
+              <a:t>D, </a:t>
+            </a:r>
+            <a:r>
+              <a:rPr lang="en-US" i="1" dirty="0" smtClean="0">
+                <a:solidFill>
+                  <a:srgbClr val="7F7F7F"/>
+                </a:solidFill>
+              </a:rPr>
+              <a:t>et al Nuclear </a:t>
+            </a:r>
+            <a:r>
+              <a:rPr lang="en-US" i="1" dirty="0">
+                <a:solidFill>
+                  <a:srgbClr val="7F7F7F"/>
+                </a:solidFill>
+              </a:rPr>
+              <a:t>Materials and </a:t>
+            </a:r>
+            <a:r>
+              <a:rPr lang="en-US" i="1" dirty="0" smtClean="0">
+                <a:solidFill>
+                  <a:srgbClr val="7F7F7F"/>
+                </a:solidFill>
+              </a:rPr>
+              <a:t>Energy 2016</a:t>
+            </a:r>
+            <a:endParaRPr lang="en-US" i="1" dirty="0">
+              <a:solidFill>
+                <a:srgbClr val="7F7F7F"/>
+              </a:solidFill>
+            </a:endParaRPr>
+          </a:p>
+        </p:txBody>
+      </p:sp>
     </p:spTree>
     <p:extLst>
       <p:ext uri="{BB962C8B-B14F-4D97-AF65-F5344CB8AC3E}">
         <p14:creationId xmlns:p14="http://schemas.microsoft.com/office/powerpoint/2010/main" val="2109852465"/>
+      </p:ext>
+    </p:extLst>
+  </p:cSld>
+  <p:clrMapOvr>
+    <a:masterClrMapping/>
+  </p:clrMapOvr>
+  <p:timing>
+    <p:tnLst>
+      <p:par>
+        <p:cTn xmlns:p14="http://schemas.microsoft.com/office/powerpoint/2010/main" id="1" dur="indefinite" restart="never" nodeType="tmRoot"/>
+      </p:par>
+    </p:tnLst>
+  </p:timing>
+</p:sld>
+</file>
+
+<file path=ppt/slides/slide2.xml><?xml version="1.0" encoding="utf-8"?>
+<p:sld xmlns:a="http://schemas.openxmlformats.org/drawingml/2006/main" xmlns:r="http://schemas.openxmlformats.org/officeDocument/2006/relationships" xmlns:p="http://schemas.openxmlformats.org/presentationml/2006/main">
+  <p:cSld>
+    <p:spTree>
+      <p:nvGrpSpPr>
+        <p:cNvPr id="1" name=""/>
+        <p:cNvGrpSpPr/>
+        <p:nvPr/>
+      </p:nvGrpSpPr>
+      <p:grpSpPr>
+        <a:xfrm>
+          <a:off x="0" y="0"/>
+          <a:ext cx="0" cy="0"/>
+          <a:chOff x="0" y="0"/>
+          <a:chExt cx="0" cy="0"/>
+        </a:xfrm>
+      </p:grpSpPr>
+      <p:sp>
+        <p:nvSpPr>
+          <p:cNvPr id="2" name="Title 1"/>
+          <p:cNvSpPr>
+            <a:spLocks noGrp="1"/>
+          </p:cNvSpPr>
+          <p:nvPr>
+            <p:ph type="title"/>
+          </p:nvPr>
+        </p:nvSpPr>
+        <p:spPr/>
+        <p:txBody>
+          <a:bodyPr/>
+          <a:lstStyle/>
+          <a:p>
+            <a:r>
+              <a:rPr lang="en-US" dirty="0" smtClean="0"/>
+              <a:t>Highlights from 2017 campaign</a:t>
+            </a:r>
+            <a:endParaRPr lang="en-US" dirty="0"/>
+          </a:p>
+        </p:txBody>
+      </p:sp>
+      <p:sp>
+        <p:nvSpPr>
+          <p:cNvPr id="4" name="Footer Placeholder 3"/>
+          <p:cNvSpPr>
+            <a:spLocks noGrp="1"/>
+          </p:cNvSpPr>
+          <p:nvPr>
+            <p:ph type="ftr" sz="quarter" idx="11"/>
+          </p:nvPr>
+        </p:nvSpPr>
+        <p:spPr/>
+        <p:txBody>
+          <a:bodyPr/>
+          <a:lstStyle/>
+          <a:p>
+            <a:pPr algn="r"/>
+            <a:r>
+              <a:rPr lang="en-GB" smtClean="0"/>
+              <a:t>H. Meyer | ITPA PEP TGM | Garching, Germany | 23rd Oct. 2015 |</a:t>
+            </a:r>
+            <a:endParaRPr lang="en-GB" dirty="0"/>
+          </a:p>
+        </p:txBody>
+      </p:sp>
+      <p:sp>
+        <p:nvSpPr>
+          <p:cNvPr id="7" name="TextBox 6"/>
+          <p:cNvSpPr txBox="1"/>
+          <p:nvPr/>
+        </p:nvSpPr>
+        <p:spPr>
+          <a:xfrm>
+            <a:off x="695743" y="620688"/>
+            <a:ext cx="697702" cy="369332"/>
+          </a:xfrm>
+          <a:prstGeom prst="rect">
+            <a:avLst/>
+          </a:prstGeom>
+          <a:noFill/>
+        </p:spPr>
+        <p:txBody>
+          <a:bodyPr wrap="none" rtlCol="0">
+            <a:spAutoFit/>
+          </a:bodyPr>
+          <a:lstStyle/>
+          <a:p>
+            <a:r>
+              <a:rPr lang="en-US" dirty="0" smtClean="0">
+                <a:latin typeface="Arial"/>
+                <a:cs typeface="Arial"/>
+              </a:rPr>
+              <a:t>AUG</a:t>
+            </a:r>
+            <a:endParaRPr lang="en-US" dirty="0" smtClean="0">
+              <a:latin typeface="Arial"/>
+              <a:cs typeface="Arial"/>
+            </a:endParaRPr>
+          </a:p>
+        </p:txBody>
+      </p:sp>
+      <p:sp>
+        <p:nvSpPr>
+          <p:cNvPr id="8" name="TextBox 7"/>
+          <p:cNvSpPr txBox="1"/>
+          <p:nvPr/>
+        </p:nvSpPr>
+        <p:spPr>
+          <a:xfrm>
+            <a:off x="5364088" y="620688"/>
+            <a:ext cx="646331" cy="369332"/>
+          </a:xfrm>
+          <a:prstGeom prst="rect">
+            <a:avLst/>
+          </a:prstGeom>
+          <a:noFill/>
+        </p:spPr>
+        <p:txBody>
+          <a:bodyPr wrap="none" rtlCol="0">
+            <a:spAutoFit/>
+          </a:bodyPr>
+          <a:lstStyle/>
+          <a:p>
+            <a:r>
+              <a:rPr lang="en-US" dirty="0" smtClean="0">
+                <a:latin typeface="Arial"/>
+                <a:cs typeface="Arial"/>
+              </a:rPr>
+              <a:t>TCV</a:t>
+            </a:r>
+            <a:endParaRPr lang="en-US" dirty="0" smtClean="0">
+              <a:latin typeface="Arial"/>
+              <a:cs typeface="Arial"/>
+            </a:endParaRPr>
+          </a:p>
+        </p:txBody>
+      </p:sp>
+      <p:pic>
+        <p:nvPicPr>
+          <p:cNvPr id="9" name="Picture 8" descr="IpConstantq95_samedensity.png"/>
+          <p:cNvPicPr>
+            <a:picLocks noChangeAspect="1"/>
+          </p:cNvPicPr>
+          <p:nvPr/>
+        </p:nvPicPr>
+        <p:blipFill rotWithShape="1">
+          <a:blip r:embed="rId2" cstate="print">
+            <a:extLst>
+              <a:ext uri="{28A0092B-C50C-407E-A947-70E740481C1C}">
+                <a14:useLocalDpi xmlns:a14="http://schemas.microsoft.com/office/drawing/2010/main" val="0"/>
+              </a:ext>
+            </a:extLst>
+          </a:blip>
+          <a:srcRect l="3968" b="4560"/>
+          <a:stretch/>
+        </p:blipFill>
+        <p:spPr>
+          <a:xfrm>
+            <a:off x="4276895" y="908720"/>
+            <a:ext cx="3840763" cy="4908956"/>
+          </a:xfrm>
+          <a:prstGeom prst="rect">
+            <a:avLst/>
+          </a:prstGeom>
+        </p:spPr>
+      </p:pic>
+      <p:pic>
+        <p:nvPicPr>
+          <p:cNvPr id="10" name="Picture 9" descr="IpConstantq95_samedensity.png"/>
+          <p:cNvPicPr>
+            <a:picLocks noChangeAspect="1"/>
+          </p:cNvPicPr>
+          <p:nvPr/>
+        </p:nvPicPr>
+        <p:blipFill rotWithShape="1">
+          <a:blip r:embed="rId3" cstate="print">
+            <a:extLst>
+              <a:ext uri="{28A0092B-C50C-407E-A947-70E740481C1C}">
+                <a14:useLocalDpi xmlns:a14="http://schemas.microsoft.com/office/drawing/2010/main" val="0"/>
+              </a:ext>
+            </a:extLst>
+          </a:blip>
+          <a:srcRect l="5080" b="4560"/>
+          <a:stretch/>
+        </p:blipFill>
+        <p:spPr>
+          <a:xfrm>
+            <a:off x="270932" y="908720"/>
+            <a:ext cx="3796289" cy="4908956"/>
+          </a:xfrm>
+          <a:prstGeom prst="rect">
+            <a:avLst/>
+          </a:prstGeom>
+        </p:spPr>
+      </p:pic>
+      <p:sp>
+        <p:nvSpPr>
+          <p:cNvPr id="11" name="TextBox 10"/>
+          <p:cNvSpPr txBox="1"/>
+          <p:nvPr/>
+        </p:nvSpPr>
+        <p:spPr>
+          <a:xfrm>
+            <a:off x="-36512" y="5980638"/>
+            <a:ext cx="8866530" cy="646331"/>
+          </a:xfrm>
+          <a:prstGeom prst="rect">
+            <a:avLst/>
+          </a:prstGeom>
+          <a:noFill/>
+        </p:spPr>
+        <p:txBody>
+          <a:bodyPr wrap="none" rtlCol="0">
+            <a:spAutoFit/>
+          </a:bodyPr>
+          <a:lstStyle/>
+          <a:p>
+            <a:pPr marL="285750" indent="-285750">
+              <a:buFont typeface="Arial"/>
+              <a:buChar char="•"/>
+            </a:pPr>
+            <a:r>
+              <a:rPr lang="en-US" dirty="0" err="1" smtClean="0">
+                <a:latin typeface="Arial"/>
+                <a:cs typeface="Arial"/>
+              </a:rPr>
+              <a:t>I</a:t>
+            </a:r>
+            <a:r>
+              <a:rPr lang="en-US" baseline="-25000" dirty="0" err="1" smtClean="0">
+                <a:latin typeface="Arial"/>
+                <a:cs typeface="Arial"/>
+              </a:rPr>
+              <a:t>p</a:t>
+            </a:r>
+            <a:r>
+              <a:rPr lang="en-US" dirty="0" smtClean="0">
+                <a:latin typeface="Arial"/>
+                <a:cs typeface="Arial"/>
+              </a:rPr>
+              <a:t> scans at constant q</a:t>
+            </a:r>
+            <a:r>
+              <a:rPr lang="en-US" baseline="-25000" dirty="0" smtClean="0">
+                <a:latin typeface="Arial"/>
+                <a:cs typeface="Arial"/>
+              </a:rPr>
+              <a:t>95</a:t>
+            </a:r>
+            <a:r>
+              <a:rPr lang="en-US" dirty="0" smtClean="0">
+                <a:latin typeface="Arial"/>
+                <a:cs typeface="Arial"/>
+              </a:rPr>
+              <a:t> to compare the effect of </a:t>
+            </a:r>
+            <a:r>
+              <a:rPr lang="en-US" dirty="0" err="1" smtClean="0">
+                <a:latin typeface="Arial"/>
+                <a:cs typeface="Arial"/>
+              </a:rPr>
+              <a:t>I</a:t>
+            </a:r>
+            <a:r>
+              <a:rPr lang="en-US" baseline="-25000" dirty="0" err="1" smtClean="0">
+                <a:latin typeface="Arial"/>
+                <a:cs typeface="Arial"/>
+              </a:rPr>
+              <a:t>p</a:t>
+            </a:r>
+            <a:r>
+              <a:rPr lang="en-US" dirty="0" smtClean="0">
+                <a:latin typeface="Arial"/>
+                <a:cs typeface="Arial"/>
+              </a:rPr>
+              <a:t> on evolution of upstream profiles</a:t>
+            </a:r>
+          </a:p>
+          <a:p>
+            <a:pPr marL="285750" indent="-285750">
+              <a:buFont typeface="Arial"/>
+              <a:buChar char="•"/>
+            </a:pPr>
+            <a:r>
+              <a:rPr lang="en-US" dirty="0" smtClean="0">
+                <a:latin typeface="Arial"/>
+                <a:cs typeface="Arial"/>
+              </a:rPr>
+              <a:t>Performed also at constant </a:t>
+            </a:r>
+            <a:r>
+              <a:rPr lang="en-US" dirty="0" err="1" smtClean="0">
+                <a:latin typeface="Arial"/>
+                <a:cs typeface="Arial"/>
+              </a:rPr>
+              <a:t>B</a:t>
+            </a:r>
+            <a:r>
+              <a:rPr lang="en-US" baseline="-25000" dirty="0" err="1" smtClean="0">
+                <a:latin typeface="Arial"/>
+                <a:cs typeface="Arial"/>
+              </a:rPr>
+              <a:t>t</a:t>
+            </a:r>
+            <a:r>
+              <a:rPr lang="en-US" dirty="0" smtClean="0">
+                <a:latin typeface="Arial"/>
+                <a:cs typeface="Arial"/>
+              </a:rPr>
+              <a:t> </a:t>
+            </a:r>
+            <a:endParaRPr lang="en-US" dirty="0" smtClean="0">
+              <a:latin typeface="Arial"/>
+              <a:cs typeface="Arial"/>
+            </a:endParaRPr>
+          </a:p>
+        </p:txBody>
+      </p:sp>
+    </p:spTree>
+    <p:extLst>
+      <p:ext uri="{BB962C8B-B14F-4D97-AF65-F5344CB8AC3E}">
+        <p14:creationId xmlns:p14="http://schemas.microsoft.com/office/powerpoint/2010/main" val="50675780"/>
       </p:ext>
     </p:extLst>
   </p:cSld>
@@ -3926,13 +4236,17 @@
           <a:bodyPr/>
           <a:lstStyle/>
           <a:p>
-            <a:endParaRPr lang="en-US"/>
-          </a:p>
-        </p:txBody>
-      </p:sp>
-      <p:sp>
-        <p:nvSpPr>
-          <p:cNvPr id="4" name="Footer Placeholder 3"/>
+            <a:r>
+              <a:rPr lang="en-US" dirty="0" smtClean="0"/>
+              <a:t>Highlights of 2017 campaign</a:t>
+            </a:r>
+            <a:endParaRPr lang="en-US" dirty="0"/>
+          </a:p>
+        </p:txBody>
+      </p:sp>
+      <p:sp>
+        <p:nvSpPr>
+          <p:cNvPr id="3" name="Footer Placeholder 2"/>
           <p:cNvSpPr>
             <a:spLocks noGrp="1"/>
           </p:cNvSpPr>
@@ -3954,16 +4268,197 @@
           </a:p>
         </p:txBody>
       </p:sp>
+      <p:pic>
+        <p:nvPicPr>
+          <p:cNvPr id="4" name="Picture 3" descr="EvolutionEdgeProfiles_34276_34281.png"/>
+          <p:cNvPicPr>
+            <a:picLocks noChangeAspect="1"/>
+          </p:cNvPicPr>
+          <p:nvPr/>
+        </p:nvPicPr>
+        <p:blipFill rotWithShape="1">
+          <a:blip r:embed="rId2" cstate="print">
+            <a:extLst>
+              <a:ext uri="{28A0092B-C50C-407E-A947-70E740481C1C}">
+                <a14:useLocalDpi xmlns:a14="http://schemas.microsoft.com/office/drawing/2010/main" val="0"/>
+              </a:ext>
+            </a:extLst>
+          </a:blip>
+          <a:srcRect l="3334" r="2592" b="2716"/>
+          <a:stretch/>
+        </p:blipFill>
+        <p:spPr>
+          <a:xfrm>
+            <a:off x="467544" y="1052736"/>
+            <a:ext cx="4838696" cy="5003803"/>
+          </a:xfrm>
+          <a:prstGeom prst="rect">
+            <a:avLst/>
+          </a:prstGeom>
+        </p:spPr>
+      </p:pic>
+      <p:sp>
+        <p:nvSpPr>
+          <p:cNvPr id="5" name="TextBox 4"/>
+          <p:cNvSpPr txBox="1"/>
+          <p:nvPr/>
+        </p:nvSpPr>
+        <p:spPr>
+          <a:xfrm>
+            <a:off x="5306240" y="1052736"/>
+            <a:ext cx="3805608" cy="3416320"/>
+          </a:xfrm>
+          <a:prstGeom prst="rect">
+            <a:avLst/>
+          </a:prstGeom>
+          <a:noFill/>
+        </p:spPr>
+        <p:txBody>
+          <a:bodyPr wrap="square" rtlCol="0">
+            <a:spAutoFit/>
+          </a:bodyPr>
+          <a:lstStyle/>
+          <a:p>
+            <a:pPr marL="285750" indent="-285750">
+              <a:buFont typeface="Arial"/>
+              <a:buChar char="•"/>
+            </a:pPr>
+            <a:r>
+              <a:rPr lang="en-US" dirty="0" smtClean="0">
+                <a:latin typeface="Arial"/>
+                <a:cs typeface="Arial"/>
+              </a:rPr>
+              <a:t>6 MW total heating power</a:t>
+            </a:r>
+          </a:p>
+          <a:p>
+            <a:pPr marL="285750" indent="-285750">
+              <a:buFont typeface="Arial"/>
+              <a:buChar char="•"/>
+            </a:pPr>
+            <a:r>
+              <a:rPr lang="en-US" dirty="0" smtClean="0">
+                <a:latin typeface="Arial"/>
+                <a:cs typeface="Arial"/>
+              </a:rPr>
+              <a:t>Density ramps performed with/</a:t>
+            </a:r>
+            <a:r>
+              <a:rPr lang="en-US" dirty="0" err="1" smtClean="0">
+                <a:latin typeface="Arial"/>
+                <a:cs typeface="Arial"/>
+              </a:rPr>
+              <a:t>wo</a:t>
+            </a:r>
+            <a:r>
+              <a:rPr lang="en-US" dirty="0" smtClean="0">
+                <a:latin typeface="Arial"/>
+                <a:cs typeface="Arial"/>
+              </a:rPr>
+              <a:t> </a:t>
+            </a:r>
+            <a:r>
+              <a:rPr lang="en-US" dirty="0" err="1" smtClean="0">
+                <a:latin typeface="Arial"/>
+                <a:cs typeface="Arial"/>
+              </a:rPr>
+              <a:t>cryopumps</a:t>
+            </a:r>
+            <a:r>
+              <a:rPr lang="en-US" dirty="0" smtClean="0">
+                <a:latin typeface="Arial"/>
+                <a:cs typeface="Arial"/>
+              </a:rPr>
+              <a:t> in order to match similar edge density</a:t>
+            </a:r>
+          </a:p>
+          <a:p>
+            <a:pPr marL="285750" indent="-285750">
+              <a:buFont typeface="Arial"/>
+              <a:buChar char="•"/>
+            </a:pPr>
+            <a:r>
+              <a:rPr lang="en-US" dirty="0" smtClean="0">
+                <a:latin typeface="Arial"/>
+                <a:cs typeface="Arial"/>
+              </a:rPr>
+              <a:t>Much higher fueling with </a:t>
+            </a:r>
+            <a:r>
+              <a:rPr lang="en-US" dirty="0" err="1" smtClean="0">
+                <a:latin typeface="Arial"/>
+                <a:cs typeface="Arial"/>
+              </a:rPr>
+              <a:t>cryopumps</a:t>
+            </a:r>
+            <a:r>
+              <a:rPr lang="en-US" dirty="0" smtClean="0">
+                <a:latin typeface="Arial"/>
+                <a:cs typeface="Arial"/>
+              </a:rPr>
+              <a:t> and degraded H-mode phase reached earlier</a:t>
+            </a:r>
+          </a:p>
+          <a:p>
+            <a:pPr marL="285750" indent="-285750">
+              <a:buFont typeface="Arial"/>
+              <a:buChar char="•"/>
+            </a:pPr>
+            <a:r>
+              <a:rPr lang="en-US" dirty="0" smtClean="0">
+                <a:latin typeface="Arial"/>
+                <a:cs typeface="Arial"/>
+              </a:rPr>
+              <a:t>SOL saturation observed in both case, more pronounced w/o </a:t>
+            </a:r>
+            <a:r>
+              <a:rPr lang="en-US" dirty="0" err="1" smtClean="0">
+                <a:latin typeface="Arial"/>
+                <a:cs typeface="Arial"/>
+              </a:rPr>
+              <a:t>cryopumps</a:t>
+            </a:r>
+            <a:endParaRPr lang="en-US" dirty="0" smtClean="0">
+              <a:latin typeface="Arial"/>
+              <a:cs typeface="Arial"/>
+            </a:endParaRPr>
+          </a:p>
+          <a:p>
+            <a:pPr marL="285750" indent="-285750">
+              <a:buFont typeface="Arial"/>
+              <a:buChar char="•"/>
+            </a:pPr>
+            <a:r>
+              <a:rPr lang="en-US" dirty="0" smtClean="0">
+                <a:latin typeface="Arial"/>
+                <a:cs typeface="Arial"/>
+              </a:rPr>
+              <a:t>Work in progress to assess the role of neutrals in this process </a:t>
+            </a:r>
+            <a:endParaRPr lang="en-US" dirty="0" smtClean="0">
+              <a:latin typeface="Arial"/>
+              <a:cs typeface="Arial"/>
+            </a:endParaRPr>
+          </a:p>
+        </p:txBody>
+      </p:sp>
     </p:spTree>
     <p:extLst>
       <p:ext uri="{BB962C8B-B14F-4D97-AF65-F5344CB8AC3E}">
-        <p14:creationId xmlns:p14="http://schemas.microsoft.com/office/powerpoint/2010/main" val="50675780"/>
+        <p14:creationId xmlns:p14="http://schemas.microsoft.com/office/powerpoint/2010/main" val="1566418231"/>
       </p:ext>
     </p:extLst>
   </p:cSld>
   <p:clrMapOvr>
     <a:masterClrMapping/>
   </p:clrMapOvr>
+  <p:timing>
+    <p:tnLst>
+      <p:par>
+        <p:cTn xmlns:p14="http://schemas.microsoft.com/office/powerpoint/2010/main" id="1" dur="indefinite" restart="never" nodeType="tmRoot"/>
+      </p:par>
+    </p:tnLst>
+  </p:timing>
 </p:sld>
 </file>
 

</xml_diff>

<commit_message>
Update an clean PPTX file for Hendrik
</commit_message>
<xml_diff>
--- a/Meetings/MST1_highlights_topic21.pptx
+++ b/Meetings/MST1_highlights_topic21.pptx
@@ -202,7 +202,7 @@
                 <a:latin typeface="Arial" panose="020B0604020202020204" pitchFamily="34" charset="0"/>
               </a:rPr>
               <a:pPr/>
-              <a:t>04.07.17</a:t>
+              <a:t>06.07.17</a:t>
             </a:fld>
             <a:endParaRPr lang="en-GB" dirty="0">
               <a:latin typeface="Arial" panose="020B0604020202020204" pitchFamily="34" charset="0"/>
@@ -381,7 +381,7 @@
             <a:fld id="{F93E6C17-F35F-4654-8DE9-B693AC206066}" type="datetimeFigureOut">
               <a:rPr lang="en-GB" smtClean="0"/>
               <a:pPr/>
-              <a:t>04.07.17</a:t>
+              <a:t>06.07.17</a:t>
             </a:fld>
             <a:endParaRPr lang="en-GB" dirty="0"/>
           </a:p>
@@ -3225,8 +3225,8 @@
         </p:nvSpPr>
         <p:spPr>
           <a:xfrm>
-            <a:off x="3491880" y="830903"/>
-            <a:ext cx="5184576" cy="1477328"/>
+            <a:off x="3333069" y="805633"/>
+            <a:ext cx="5400600" cy="2062103"/>
           </a:xfrm>
           <a:prstGeom prst="rect">
             <a:avLst/>
@@ -3239,12 +3239,12 @@
           </a:bodyPr>
           <a:lstStyle/>
           <a:p>
-            <a:pPr marL="285750" indent="-285750">
-              <a:buFont typeface="Arial"/>
-              <a:buChar char="•"/>
+            <a:pPr marL="342900" indent="-342900">
+              <a:buFont typeface="+mj-lt"/>
+              <a:buAutoNum type="arabicPeriod"/>
             </a:pPr>
             <a:r>
-              <a:rPr lang="en-GB" dirty="0" smtClean="0">
+              <a:rPr lang="en-GB" sz="1600" dirty="0" smtClean="0">
                 <a:latin typeface="Arial"/>
                 <a:cs typeface="Arial"/>
               </a:rPr>
@@ -3252,88 +3252,107 @@
             </a:r>
           </a:p>
           <a:p>
-            <a:pPr marL="285750" indent="-285750">
-              <a:buFont typeface="Arial"/>
-              <a:buChar char="•"/>
+            <a:pPr marL="342900" indent="-342900">
+              <a:buFont typeface="+mj-lt"/>
+              <a:buAutoNum type="arabicPeriod"/>
             </a:pPr>
             <a:r>
-              <a:rPr lang="en-GB" dirty="0" smtClean="0">
+              <a:rPr lang="en-GB" sz="1600" dirty="0" smtClean="0">
                 <a:latin typeface="Arial"/>
                 <a:cs typeface="Arial"/>
               </a:rPr>
               <a:t>Dependence on </a:t>
             </a:r>
             <a:r>
-              <a:rPr lang="en-GB" dirty="0" err="1" smtClean="0">
+              <a:rPr lang="en-GB" sz="1600" dirty="0" err="1" smtClean="0">
                 <a:latin typeface="Arial"/>
                 <a:cs typeface="Arial"/>
               </a:rPr>
               <a:t>divertor</a:t>
             </a:r>
             <a:r>
-              <a:rPr lang="en-GB" dirty="0" smtClean="0">
+              <a:rPr lang="en-GB" sz="1600" dirty="0" smtClean="0">
                 <a:latin typeface="Arial"/>
                 <a:cs typeface="Arial"/>
               </a:rPr>
               <a:t> </a:t>
             </a:r>
             <a:r>
-              <a:rPr lang="en-GB" dirty="0" err="1" smtClean="0">
+              <a:rPr lang="en-GB" sz="1600" dirty="0" err="1" smtClean="0">
                 <a:latin typeface="Arial"/>
                 <a:cs typeface="Arial"/>
               </a:rPr>
               <a:t>collisionality</a:t>
             </a:r>
             <a:r>
-              <a:rPr lang="en-GB" dirty="0" smtClean="0">
+              <a:rPr lang="en-GB" sz="1600" dirty="0" smtClean="0">
                 <a:latin typeface="Arial"/>
                 <a:cs typeface="Arial"/>
               </a:rPr>
               <a:t> less robust in H-Mode with strong dependence on total </a:t>
             </a:r>
             <a:r>
-              <a:rPr lang="en-GB" dirty="0" err="1" smtClean="0">
+              <a:rPr lang="en-GB" sz="1600" dirty="0" err="1" smtClean="0">
                 <a:latin typeface="Arial"/>
                 <a:cs typeface="Arial"/>
               </a:rPr>
               <a:t>fueling</a:t>
             </a:r>
-            <a:endParaRPr lang="en-GB" dirty="0" smtClean="0">
+            <a:endParaRPr lang="en-GB" sz="1600" dirty="0" smtClean="0">
               <a:latin typeface="Arial"/>
               <a:cs typeface="Arial"/>
             </a:endParaRPr>
           </a:p>
+          <a:p>
+            <a:pPr marL="342900" indent="-342900">
+              <a:buFont typeface="+mj-lt"/>
+              <a:buAutoNum type="arabicPeriod"/>
+            </a:pPr>
+            <a:r>
+              <a:rPr lang="en-GB" sz="1600" dirty="0">
+                <a:latin typeface="Arial"/>
+                <a:cs typeface="Arial"/>
+              </a:rPr>
+              <a:t>Role of neutrals at the </a:t>
+            </a:r>
+            <a:r>
+              <a:rPr lang="en-GB" sz="1600" dirty="0" err="1">
+                <a:latin typeface="Arial"/>
+                <a:cs typeface="Arial"/>
+              </a:rPr>
+              <a:t>midplane</a:t>
+            </a:r>
+            <a:r>
+              <a:rPr lang="en-GB" sz="1600" dirty="0">
+                <a:latin typeface="Arial"/>
+                <a:cs typeface="Arial"/>
+              </a:rPr>
+              <a:t> investigated so far by EIRENCE numerical </a:t>
+            </a:r>
+            <a:r>
+              <a:rPr lang="en-GB" sz="1600" dirty="0" smtClean="0">
+                <a:latin typeface="Arial"/>
+                <a:cs typeface="Arial"/>
+              </a:rPr>
+              <a:t>simulations. Steady state simulation missing intermittent character</a:t>
+            </a:r>
+            <a:endParaRPr lang="en-GB" sz="1600" dirty="0">
+              <a:latin typeface="Arial"/>
+              <a:cs typeface="Arial"/>
+            </a:endParaRPr>
+          </a:p>
+          <a:p>
+            <a:pPr marL="342900" indent="-342900">
+              <a:buFont typeface="+mj-lt"/>
+              <a:buAutoNum type="arabicPeriod"/>
+            </a:pPr>
+            <a:endParaRPr lang="en-GB" sz="1600" dirty="0" smtClean="0">
+              <a:latin typeface="Arial"/>
+              <a:cs typeface="Arial"/>
+            </a:endParaRPr>
+          </a:p>
         </p:txBody>
       </p:sp>
-      <p:pic>
-        <p:nvPicPr>
-          <p:cNvPr id="11" name="Picture 10" descr="Screen Shot 2017-07-04 at 15.28.19.png"/>
-          <p:cNvPicPr>
-            <a:picLocks noChangeAspect="1"/>
-          </p:cNvPicPr>
-          <p:nvPr/>
-        </p:nvPicPr>
-        <p:blipFill rotWithShape="1">
-          <a:blip r:embed="rId2">
-            <a:extLst>
-              <a:ext uri="{28A0092B-C50C-407E-A947-70E740481C1C}">
-                <a14:useLocalDpi xmlns:a14="http://schemas.microsoft.com/office/drawing/2010/main" val="0"/>
-              </a:ext>
-            </a:extLst>
-          </a:blip>
-          <a:srcRect t="-3274" b="34346"/>
-          <a:stretch/>
-        </p:blipFill>
-        <p:spPr>
-          <a:xfrm>
-            <a:off x="45384" y="3109124"/>
-            <a:ext cx="3839191" cy="2780928"/>
-          </a:xfrm>
-          <a:prstGeom prst="rect">
-            <a:avLst/>
-          </a:prstGeom>
-        </p:spPr>
-      </p:pic>
       <p:grpSp>
         <p:nvGrpSpPr>
           <p:cNvPr id="15" name="Group 14"/>
@@ -3342,8 +3361,8 @@
         </p:nvGrpSpPr>
         <p:grpSpPr>
           <a:xfrm>
-            <a:off x="74961" y="859186"/>
-            <a:ext cx="2768847" cy="2065758"/>
+            <a:off x="74961" y="764704"/>
+            <a:ext cx="3488927" cy="2531770"/>
             <a:chOff x="166507" y="830902"/>
             <a:chExt cx="4706530" cy="3702988"/>
           </a:xfrm>
@@ -3357,7 +3376,7 @@
             <p:nvPr/>
           </p:nvPicPr>
           <p:blipFill rotWithShape="1">
-            <a:blip r:embed="rId3">
+            <a:blip r:embed="rId2">
               <a:extLst>
                 <a:ext uri="{28A0092B-C50C-407E-A947-70E740481C1C}">
                   <a14:useLocalDpi xmlns:a14="http://schemas.microsoft.com/office/drawing/2010/main" val="0"/>
@@ -3386,7 +3405,7 @@
             <p:nvPr/>
           </p:nvPicPr>
           <p:blipFill rotWithShape="1">
-            <a:blip r:embed="rId3">
+            <a:blip r:embed="rId2">
               <a:extLst>
                 <a:ext uri="{28A0092B-C50C-407E-A947-70E740481C1C}">
                   <a14:useLocalDpi xmlns:a14="http://schemas.microsoft.com/office/drawing/2010/main" val="0"/>
@@ -3415,7 +3434,7 @@
         </p:nvSpPr>
         <p:spPr>
           <a:xfrm>
-            <a:off x="74961" y="6467482"/>
+            <a:off x="3707904" y="2852936"/>
             <a:ext cx="3809614" cy="345900"/>
           </a:xfrm>
           <a:prstGeom prst="rect">
@@ -3490,7 +3509,7 @@
           <p:nvPr/>
         </p:nvPicPr>
         <p:blipFill rotWithShape="1">
-          <a:blip r:embed="rId4">
+          <a:blip r:embed="rId3">
             <a:extLst>
               <a:ext uri="{28A0092B-C50C-407E-A947-70E740481C1C}">
                 <a14:useLocalDpi xmlns:a14="http://schemas.microsoft.com/office/drawing/2010/main" val="0"/>
@@ -3502,7 +3521,7 @@
         </p:blipFill>
         <p:spPr>
           <a:xfrm>
-            <a:off x="5004610" y="3139227"/>
+            <a:off x="5004610" y="3501008"/>
             <a:ext cx="3095784" cy="2780028"/>
           </a:xfrm>
           <a:prstGeom prst="rect">
@@ -3510,55 +3529,6 @@
           </a:prstGeom>
         </p:spPr>
       </p:pic>
-      <p:sp>
-        <p:nvSpPr>
-          <p:cNvPr id="17" name="Rectangle 16"/>
-          <p:cNvSpPr/>
-          <p:nvPr/>
-        </p:nvSpPr>
-        <p:spPr>
-          <a:xfrm>
-            <a:off x="45384" y="5890052"/>
-            <a:ext cx="4572000" cy="584776"/>
-          </a:xfrm>
-          <a:prstGeom prst="rect">
-            <a:avLst/>
-          </a:prstGeom>
-        </p:spPr>
-        <p:txBody>
-          <a:bodyPr>
-            <a:spAutoFit/>
-          </a:bodyPr>
-          <a:lstStyle/>
-          <a:p>
-            <a:pPr marL="285750" indent="-285750">
-              <a:buFont typeface="Arial"/>
-              <a:buChar char="•"/>
-            </a:pPr>
-            <a:r>
-              <a:rPr lang="en-GB" sz="1600" dirty="0">
-                <a:latin typeface="Arial"/>
-                <a:cs typeface="Arial"/>
-              </a:rPr>
-              <a:t>Role of neutrals at the </a:t>
-            </a:r>
-            <a:r>
-              <a:rPr lang="en-GB" sz="1600" dirty="0" err="1">
-                <a:latin typeface="Arial"/>
-                <a:cs typeface="Arial"/>
-              </a:rPr>
-              <a:t>midplane</a:t>
-            </a:r>
-            <a:r>
-              <a:rPr lang="en-GB" sz="1600" dirty="0">
-                <a:latin typeface="Arial"/>
-                <a:cs typeface="Arial"/>
-              </a:rPr>
-              <a:t> investigated so far by EIRENCE numerical simulations</a:t>
-            </a:r>
-          </a:p>
-        </p:txBody>
-      </p:sp>
       <p:sp>
         <p:nvSpPr>
           <p:cNvPr id="18" name="Rectangle 17"/>
@@ -3568,7 +3538,7 @@
         <p:spPr>
           <a:xfrm>
             <a:off x="47220" y="764704"/>
-            <a:ext cx="8917268" cy="2156961"/>
+            <a:ext cx="8701244" cy="2527752"/>
           </a:xfrm>
           <a:prstGeom prst="rect">
             <a:avLst/>
@@ -3601,19 +3571,154 @@
       </p:sp>
       <p:sp>
         <p:nvSpPr>
-          <p:cNvPr id="19" name="Rectangle 18"/>
-          <p:cNvSpPr/>
+          <p:cNvPr id="20" name="TextBox 19"/>
+          <p:cNvSpPr txBox="1"/>
           <p:nvPr/>
         </p:nvSpPr>
         <p:spPr>
           <a:xfrm>
-            <a:off x="45384" y="3140968"/>
-            <a:ext cx="4427984" cy="3333860"/>
+            <a:off x="521275" y="3789040"/>
+            <a:ext cx="4338757" cy="1446550"/>
           </a:xfrm>
           <a:prstGeom prst="rect">
             <a:avLst/>
           </a:prstGeom>
           <a:noFill/>
+        </p:spPr>
+        <p:txBody>
+          <a:bodyPr wrap="square" rtlCol="0">
+            <a:spAutoFit/>
+          </a:bodyPr>
+          <a:lstStyle/>
+          <a:p>
+            <a:r>
+              <a:rPr lang="en-US" dirty="0" smtClean="0">
+                <a:latin typeface="Arial"/>
+                <a:cs typeface="Arial"/>
+              </a:rPr>
+              <a:t>TCV L-Mode confirms complex dependence </a:t>
+            </a:r>
+          </a:p>
+          <a:p>
+            <a:r>
+              <a:rPr lang="en-US" dirty="0" smtClean="0">
+                <a:latin typeface="Arial"/>
+                <a:cs typeface="Arial"/>
+              </a:rPr>
+              <a:t>on </a:t>
+            </a:r>
+            <a:r>
+              <a:rPr lang="en-US" dirty="0" err="1" smtClean="0">
+                <a:latin typeface="Arial"/>
+                <a:cs typeface="Arial"/>
+              </a:rPr>
+              <a:t>Divertor</a:t>
+            </a:r>
+            <a:r>
+              <a:rPr lang="en-US" dirty="0" smtClean="0">
+                <a:latin typeface="Arial"/>
+                <a:cs typeface="Arial"/>
+              </a:rPr>
+              <a:t> </a:t>
+            </a:r>
+            <a:r>
+              <a:rPr lang="en-US" dirty="0" err="1" smtClean="0">
+                <a:latin typeface="Arial"/>
+                <a:cs typeface="Arial"/>
+              </a:rPr>
+              <a:t>collisionality</a:t>
+            </a:r>
+            <a:r>
+              <a:rPr lang="en-US" dirty="0" smtClean="0">
+                <a:latin typeface="Arial"/>
+                <a:cs typeface="Arial"/>
+              </a:rPr>
+              <a:t> and </a:t>
+            </a:r>
+            <a:r>
+              <a:rPr lang="en-US" dirty="0" smtClean="0">
+                <a:latin typeface="Arial"/>
+                <a:cs typeface="Arial"/>
+              </a:rPr>
+              <a:t>different behavior of near and far SOL</a:t>
+            </a:r>
+            <a:r>
+              <a:rPr lang="en-US" dirty="0" smtClean="0">
+                <a:latin typeface="Arial"/>
+                <a:cs typeface="Arial"/>
+              </a:rPr>
+              <a:t> </a:t>
+            </a:r>
+            <a:r>
+              <a:rPr lang="en-US" sz="1600" i="1" dirty="0" smtClean="0">
+                <a:solidFill>
+                  <a:srgbClr val="7F7F7F"/>
+                </a:solidFill>
+                <a:latin typeface="Arial"/>
+                <a:cs typeface="Arial"/>
+              </a:rPr>
+              <a:t>(Vianello </a:t>
+            </a:r>
+            <a:r>
+              <a:rPr lang="en-US" sz="1600" i="1" dirty="0" smtClean="0">
+                <a:solidFill>
+                  <a:srgbClr val="7F7F7F"/>
+                </a:solidFill>
+                <a:latin typeface="Arial"/>
+                <a:cs typeface="Arial"/>
+              </a:rPr>
+              <a:t>NF </a:t>
+            </a:r>
+            <a:r>
+              <a:rPr lang="mr-IN" sz="1600" i="1" dirty="0">
+                <a:solidFill>
+                  <a:srgbClr val="7F7F7F"/>
+                </a:solidFill>
+                <a:latin typeface="Arial"/>
+                <a:cs typeface="Arial"/>
+              </a:rPr>
+              <a:t>https://doi.org/10.1088/1741-4326/aa7db3</a:t>
+            </a:r>
+            <a:r>
+              <a:rPr lang="en-US" sz="1600" i="1" dirty="0" smtClean="0">
+                <a:solidFill>
+                  <a:srgbClr val="7F7F7F"/>
+                </a:solidFill>
+                <a:latin typeface="Arial"/>
+                <a:cs typeface="Arial"/>
+              </a:rPr>
+              <a:t>) </a:t>
+            </a:r>
+            <a:endParaRPr lang="en-US" sz="1600" i="1" dirty="0" smtClean="0">
+              <a:solidFill>
+                <a:srgbClr val="7F7F7F"/>
+              </a:solidFill>
+              <a:latin typeface="Arial"/>
+              <a:cs typeface="Arial"/>
+            </a:endParaRPr>
+          </a:p>
+        </p:txBody>
+      </p:sp>
+      <p:sp>
+        <p:nvSpPr>
+          <p:cNvPr id="21" name="Rectangle 20"/>
+          <p:cNvSpPr/>
+          <p:nvPr/>
+        </p:nvSpPr>
+        <p:spPr>
+          <a:xfrm>
+            <a:off x="47220" y="3501008"/>
+            <a:ext cx="8701244" cy="2808312"/>
+          </a:xfrm>
+          <a:prstGeom prst="rect">
+            <a:avLst/>
+          </a:prstGeom>
+          <a:noFill/>
+          <a:ln>
+            <a:solidFill>
+              <a:srgbClr val="FF6600"/>
+            </a:solidFill>
+          </a:ln>
           <a:effectLst/>
         </p:spPr>
         <p:style>
@@ -3641,145 +3746,14 @@
       </p:sp>
       <p:sp>
         <p:nvSpPr>
-          <p:cNvPr id="20" name="TextBox 19"/>
-          <p:cNvSpPr txBox="1"/>
-          <p:nvPr/>
-        </p:nvSpPr>
-        <p:spPr>
-          <a:xfrm>
-            <a:off x="4475517" y="5821151"/>
-            <a:ext cx="5427224" cy="646331"/>
-          </a:xfrm>
-          <a:prstGeom prst="rect">
-            <a:avLst/>
-          </a:prstGeom>
-          <a:noFill/>
-        </p:spPr>
-        <p:txBody>
-          <a:bodyPr wrap="square" rtlCol="0">
-            <a:spAutoFit/>
-          </a:bodyPr>
-          <a:lstStyle/>
-          <a:p>
-            <a:r>
-              <a:rPr lang="en-US" dirty="0" smtClean="0">
-                <a:latin typeface="Arial"/>
-                <a:cs typeface="Arial"/>
-              </a:rPr>
-              <a:t>TCV L-Mode confirms complex dependence </a:t>
-            </a:r>
-          </a:p>
-          <a:p>
-            <a:r>
-              <a:rPr lang="en-US" dirty="0" smtClean="0">
-                <a:latin typeface="Arial"/>
-                <a:cs typeface="Arial"/>
-              </a:rPr>
-              <a:t>on </a:t>
-            </a:r>
-            <a:r>
-              <a:rPr lang="en-US" dirty="0" err="1" smtClean="0">
-                <a:latin typeface="Arial"/>
-                <a:cs typeface="Arial"/>
-              </a:rPr>
-              <a:t>Divertor</a:t>
-            </a:r>
-            <a:r>
-              <a:rPr lang="en-US" dirty="0" smtClean="0">
-                <a:latin typeface="Arial"/>
-                <a:cs typeface="Arial"/>
-              </a:rPr>
-              <a:t> </a:t>
-            </a:r>
-            <a:r>
-              <a:rPr lang="en-US" dirty="0" err="1" smtClean="0">
-                <a:latin typeface="Arial"/>
-                <a:cs typeface="Arial"/>
-              </a:rPr>
-              <a:t>collisionality</a:t>
-            </a:r>
-            <a:r>
-              <a:rPr lang="en-US" dirty="0" smtClean="0">
-                <a:latin typeface="Arial"/>
-                <a:cs typeface="Arial"/>
-              </a:rPr>
-              <a:t> </a:t>
-            </a:r>
-            <a:r>
-              <a:rPr lang="en-US" sz="1600" i="1" dirty="0" smtClean="0">
-                <a:solidFill>
-                  <a:srgbClr val="7F7F7F"/>
-                </a:solidFill>
-                <a:latin typeface="Arial"/>
-                <a:cs typeface="Arial"/>
-              </a:rPr>
-              <a:t>(Vianello IAEA 2016) </a:t>
-            </a:r>
-            <a:endParaRPr lang="en-US" sz="1600" i="1" dirty="0" smtClean="0">
-              <a:solidFill>
-                <a:srgbClr val="7F7F7F"/>
-              </a:solidFill>
-              <a:latin typeface="Arial"/>
-              <a:cs typeface="Arial"/>
-            </a:endParaRPr>
-          </a:p>
-        </p:txBody>
-      </p:sp>
-      <p:sp>
-        <p:nvSpPr>
-          <p:cNvPr id="21" name="Rectangle 20"/>
-          <p:cNvSpPr/>
-          <p:nvPr/>
-        </p:nvSpPr>
-        <p:spPr>
-          <a:xfrm>
-            <a:off x="4528797" y="3139227"/>
-            <a:ext cx="4579707" cy="3321947"/>
-          </a:xfrm>
-          <a:prstGeom prst="rect">
-            <a:avLst/>
-          </a:prstGeom>
-          <a:noFill/>
-          <a:ln>
-            <a:solidFill>
-              <a:srgbClr val="FF6600"/>
-            </a:solidFill>
-          </a:ln>
-          <a:effectLst/>
-        </p:spPr>
-        <p:style>
-          <a:lnRef idx="1">
-            <a:schemeClr val="accent1"/>
-          </a:lnRef>
-          <a:fillRef idx="3">
-            <a:schemeClr val="accent1"/>
-          </a:fillRef>
-          <a:effectRef idx="2">
-            <a:schemeClr val="accent1"/>
-          </a:effectRef>
-          <a:fontRef idx="minor">
-            <a:schemeClr val="lt1"/>
-          </a:fontRef>
-        </p:style>
-        <p:txBody>
-          <a:bodyPr rtlCol="0" anchor="ctr"/>
-          <a:lstStyle/>
-          <a:p>
-            <a:pPr algn="ctr"/>
-            <a:endParaRPr lang="en-US" dirty="0"/>
-          </a:p>
-        </p:txBody>
-      </p:sp>
-      <p:sp>
-        <p:nvSpPr>
           <p:cNvPr id="22" name="Rectangle 21"/>
           <p:cNvSpPr/>
           <p:nvPr/>
         </p:nvSpPr>
         <p:spPr>
           <a:xfrm>
-            <a:off x="2843808" y="2367171"/>
-            <a:ext cx="5958408" cy="369332"/>
+            <a:off x="3707904" y="2536785"/>
+            <a:ext cx="4652085" cy="338554"/>
           </a:xfrm>
           <a:prstGeom prst="rect">
             <a:avLst/>
@@ -3792,7 +3766,7 @@
           <a:lstStyle/>
           <a:p>
             <a:r>
-              <a:rPr lang="en-US" i="1" dirty="0" err="1" smtClean="0">
+              <a:rPr lang="en-US" sz="1600" i="1" dirty="0" err="1" smtClean="0">
                 <a:solidFill>
                   <a:srgbClr val="7F7F7F"/>
                 </a:solidFill>
@@ -3800,7 +3774,7 @@
               <a:t>Carralero</a:t>
             </a:r>
             <a:r>
-              <a:rPr lang="en-US" i="1" dirty="0" smtClean="0">
+              <a:rPr lang="en-US" sz="1600" i="1" dirty="0" smtClean="0">
                 <a:solidFill>
                   <a:srgbClr val="7F7F7F"/>
                 </a:solidFill>
@@ -3808,7 +3782,7 @@
               <a:t> </a:t>
             </a:r>
             <a:r>
-              <a:rPr lang="en-US" i="1" dirty="0">
+              <a:rPr lang="en-US" sz="1600" i="1" dirty="0">
                 <a:solidFill>
                   <a:srgbClr val="7F7F7F"/>
                 </a:solidFill>
@@ -3816,7 +3790,7 @@
               <a:t>D, </a:t>
             </a:r>
             <a:r>
-              <a:rPr lang="en-US" i="1" dirty="0" smtClean="0">
+              <a:rPr lang="en-US" sz="1600" i="1" dirty="0" smtClean="0">
                 <a:solidFill>
                   <a:srgbClr val="7F7F7F"/>
                 </a:solidFill>
@@ -3824,7 +3798,7 @@
               <a:t>et al Nuclear </a:t>
             </a:r>
             <a:r>
-              <a:rPr lang="en-US" i="1" dirty="0">
+              <a:rPr lang="en-US" sz="1600" i="1" dirty="0">
                 <a:solidFill>
                   <a:srgbClr val="7F7F7F"/>
                 </a:solidFill>
@@ -3832,14 +3806,14 @@
               <a:t>Materials and </a:t>
             </a:r>
             <a:r>
-              <a:rPr lang="en-US" i="1" dirty="0" smtClean="0">
+              <a:rPr lang="en-US" sz="1600" i="1" dirty="0" smtClean="0">
                 <a:solidFill>
                   <a:srgbClr val="7F7F7F"/>
                 </a:solidFill>
               </a:rPr>
               <a:t>Energy 2016</a:t>
             </a:r>
-            <a:endParaRPr lang="en-US" i="1" dirty="0">
+            <a:endParaRPr lang="en-US" sz="1600" i="1" dirty="0">
               <a:solidFill>
                 <a:srgbClr val="7F7F7F"/>
               </a:solidFill>
@@ -3931,78 +3905,6 @@
           </a:p>
         </p:txBody>
       </p:sp>
-      <p:sp>
-        <p:nvSpPr>
-          <p:cNvPr id="7" name="TextBox 6"/>
-          <p:cNvSpPr txBox="1"/>
-          <p:nvPr/>
-        </p:nvSpPr>
-        <p:spPr>
-          <a:xfrm>
-            <a:off x="695743" y="620688"/>
-            <a:ext cx="697702" cy="369332"/>
-          </a:xfrm>
-          <a:prstGeom prst="rect">
-            <a:avLst/>
-          </a:prstGeom>
-          <a:noFill/>
-        </p:spPr>
-        <p:txBody>
-          <a:bodyPr wrap="none" rtlCol="0">
-            <a:spAutoFit/>
-          </a:bodyPr>
-          <a:lstStyle/>
-          <a:p>
-            <a:r>
-              <a:rPr lang="en-US" dirty="0" smtClean="0">
-                <a:latin typeface="Arial"/>
-                <a:cs typeface="Arial"/>
-              </a:rPr>
-              <a:t>AUG</a:t>
-            </a:r>
-            <a:endParaRPr lang="en-US" dirty="0" smtClean="0">
-              <a:latin typeface="Arial"/>
-              <a:cs typeface="Arial"/>
-            </a:endParaRPr>
-          </a:p>
-        </p:txBody>
-      </p:sp>
-      <p:sp>
-        <p:nvSpPr>
-          <p:cNvPr id="8" name="TextBox 7"/>
-          <p:cNvSpPr txBox="1"/>
-          <p:nvPr/>
-        </p:nvSpPr>
-        <p:spPr>
-          <a:xfrm>
-            <a:off x="5364088" y="620688"/>
-            <a:ext cx="646331" cy="369332"/>
-          </a:xfrm>
-          <a:prstGeom prst="rect">
-            <a:avLst/>
-          </a:prstGeom>
-          <a:noFill/>
-        </p:spPr>
-        <p:txBody>
-          <a:bodyPr wrap="none" rtlCol="0">
-            <a:spAutoFit/>
-          </a:bodyPr>
-          <a:lstStyle/>
-          <a:p>
-            <a:r>
-              <a:rPr lang="en-US" dirty="0" smtClean="0">
-                <a:latin typeface="Arial"/>
-                <a:cs typeface="Arial"/>
-              </a:rPr>
-              <a:t>TCV</a:t>
-            </a:r>
-            <a:endParaRPr lang="en-US" dirty="0" smtClean="0">
-              <a:latin typeface="Arial"/>
-              <a:cs typeface="Arial"/>
-            </a:endParaRPr>
-          </a:p>
-        </p:txBody>
-      </p:sp>
       <p:pic>
         <p:nvPicPr>
           <p:cNvPr id="9" name="Picture 8" descr="IpConstantq95_samedensity.png"/>
@@ -4024,7 +3926,7 @@
         </p:blipFill>
         <p:spPr>
           <a:xfrm>
-            <a:off x="4276895" y="908720"/>
+            <a:off x="4276895" y="824300"/>
             <a:ext cx="3840763" cy="4908956"/>
           </a:xfrm>
           <a:prstGeom prst="rect">
@@ -4053,7 +3955,7 @@
         </p:blipFill>
         <p:spPr>
           <a:xfrm>
-            <a:off x="270932" y="908720"/>
+            <a:off x="270932" y="824300"/>
             <a:ext cx="3796289" cy="4908956"/>
           </a:xfrm>
           <a:prstGeom prst="rect">
@@ -4177,10 +4079,70 @@
               </a:rPr>
               <a:t> </a:t>
             </a:r>
-            <a:endParaRPr lang="en-US" dirty="0" smtClean="0">
-              <a:latin typeface="Arial"/>
-              <a:cs typeface="Arial"/>
-            </a:endParaRPr>
+          </a:p>
+        </p:txBody>
+      </p:sp>
+      <p:sp>
+        <p:nvSpPr>
+          <p:cNvPr id="7" name="TextBox 6"/>
+          <p:cNvSpPr txBox="1"/>
+          <p:nvPr/>
+        </p:nvSpPr>
+        <p:spPr>
+          <a:xfrm>
+            <a:off x="2051720" y="1484784"/>
+            <a:ext cx="697702" cy="369332"/>
+          </a:xfrm>
+          <a:prstGeom prst="rect">
+            <a:avLst/>
+          </a:prstGeom>
+          <a:noFill/>
+        </p:spPr>
+        <p:txBody>
+          <a:bodyPr wrap="none" rtlCol="0">
+            <a:spAutoFit/>
+          </a:bodyPr>
+          <a:lstStyle/>
+          <a:p>
+            <a:r>
+              <a:rPr lang="en-US" dirty="0" smtClean="0">
+                <a:latin typeface="Arial"/>
+                <a:cs typeface="Arial"/>
+              </a:rPr>
+              <a:t>AUG</a:t>
+            </a:r>
+          </a:p>
+        </p:txBody>
+      </p:sp>
+      <p:sp>
+        <p:nvSpPr>
+          <p:cNvPr id="8" name="TextBox 7"/>
+          <p:cNvSpPr txBox="1"/>
+          <p:nvPr/>
+        </p:nvSpPr>
+        <p:spPr>
+          <a:xfrm>
+            <a:off x="5508104" y="1495872"/>
+            <a:ext cx="646331" cy="369332"/>
+          </a:xfrm>
+          <a:prstGeom prst="rect">
+            <a:avLst/>
+          </a:prstGeom>
+          <a:noFill/>
+        </p:spPr>
+        <p:txBody>
+          <a:bodyPr wrap="none" rtlCol="0">
+            <a:spAutoFit/>
+          </a:bodyPr>
+          <a:lstStyle/>
+          <a:p>
+            <a:r>
+              <a:rPr lang="en-US" dirty="0" smtClean="0">
+                <a:latin typeface="Arial"/>
+                <a:cs typeface="Arial"/>
+              </a:rPr>
+              <a:t>TCV</a:t>
+            </a:r>
           </a:p>
         </p:txBody>
       </p:sp>
@@ -4306,7 +4268,7 @@
         <p:spPr>
           <a:xfrm>
             <a:off x="5306240" y="1052736"/>
-            <a:ext cx="3805608" cy="3416320"/>
+            <a:ext cx="3805608" cy="3693319"/>
           </a:xfrm>
           <a:prstGeom prst="rect">
             <a:avLst/>
@@ -4396,7 +4358,21 @@
                 <a:latin typeface="Arial"/>
                 <a:cs typeface="Arial"/>
               </a:rPr>
-              <a:t> and degraded H-mode phase reached earlier</a:t>
+              <a:t> </a:t>
+            </a:r>
+            <a:r>
+              <a:rPr lang="en-US" dirty="0" smtClean="0">
+                <a:latin typeface="Arial"/>
+                <a:cs typeface="Arial"/>
+              </a:rPr>
+              <a:t>needed and </a:t>
+            </a:r>
+            <a:r>
+              <a:rPr lang="en-US" dirty="0" smtClean="0">
+                <a:latin typeface="Arial"/>
+                <a:cs typeface="Arial"/>
+              </a:rPr>
+              <a:t>degraded H-mode phase reached earlier</a:t>
             </a:r>
           </a:p>
           <a:p>
@@ -4433,7 +4409,14 @@
                 <a:latin typeface="Arial"/>
                 <a:cs typeface="Arial"/>
               </a:rPr>
-              <a:t>Work in progress to assess the role of neutrals in this process </a:t>
+              <a:t>Work in progress to assess the role of neutrals in this </a:t>
+            </a:r>
+            <a:r>
+              <a:rPr lang="en-US" dirty="0" smtClean="0">
+                <a:latin typeface="Arial"/>
+                <a:cs typeface="Arial"/>
+              </a:rPr>
+              <a:t>process </a:t>
             </a:r>
             <a:endParaRPr lang="en-US" dirty="0" smtClean="0">
               <a:latin typeface="Arial"/>

</xml_diff>